<commit_message>
updating HTML in Github
</commit_message>
<xml_diff>
--- a/New PopUpStore.pptx
+++ b/New PopUpStore.pptx
@@ -1920,8 +1920,8 @@
         <a:lstStyle/>
         <a:p>
           <a:r>
-            <a:rPr lang="en-US"/>
-            <a:t>Lack of ability to apply, in a proper wat the techniques seen previous weeks.  </a:t>
+            <a:rPr lang="en-US" dirty="0"/>
+            <a:t>Lack of ability to apply, in a proper way, the techniques seen previous weeks.  </a:t>
           </a:r>
         </a:p>
       </dgm:t>
@@ -2092,7 +2092,7 @@
 <dgm:dataModel xmlns:dgm="http://schemas.openxmlformats.org/drawingml/2006/diagram" xmlns:a="http://schemas.openxmlformats.org/drawingml/2006/main">
   <dgm:ptLst>
     <dgm:pt modelId="{BCB2B135-672C-4FBF-B483-A12C0D416932}" type="doc">
-      <dgm:prSet loTypeId="urn:microsoft.com/office/officeart/2005/8/layout/matrix2" loCatId="matrix" qsTypeId="urn:microsoft.com/office/officeart/2005/8/quickstyle/simple1" qsCatId="simple" csTypeId="urn:microsoft.com/office/officeart/2005/8/colors/colorful5" csCatId="colorful"/>
+      <dgm:prSet loTypeId="urn:microsoft.com/office/officeart/2005/8/layout/matrix2" loCatId="matrix" qsTypeId="urn:microsoft.com/office/officeart/2005/8/quickstyle/simple1" qsCatId="simple" csTypeId="urn:microsoft.com/office/officeart/2005/8/colors/colorful5" csCatId="colorful" phldr="1"/>
       <dgm:spPr/>
       <dgm:t>
         <a:bodyPr/>
@@ -2228,8 +2228,8 @@
         <a:lstStyle/>
         <a:p>
           <a:r>
-            <a:rPr lang="en-US"/>
-            <a:t>Create a function to iterate through the different pages and recollect all the data in two json files. One for selling apartments and another for renting apartments. I've got around 18000 rows and 58 columns of selling apartments and 2300 rows and 8 columns of renting apartments.</a:t>
+            <a:rPr lang="en-US" dirty="0"/>
+            <a:t>Create a function to iterate through the different pages and recollect all the data in two json files. One for selling apartments and another for renting apartments. I've got around 18000 rows and 58 columns of selling apartments and 2300 rows and 58 columns of renting apartments.</a:t>
           </a:r>
         </a:p>
       </dgm:t>
@@ -2637,8 +2637,8 @@
             <a:buNone/>
           </a:pPr>
           <a:r>
-            <a:rPr lang="en-US" sz="2500" kern="1200"/>
-            <a:t>Lack of ability to apply, in a proper wat the techniques seen previous weeks.  </a:t>
+            <a:rPr lang="en-US" sz="2500" kern="1200" dirty="0"/>
+            <a:t>Lack of ability to apply, in a proper way, the techniques seen previous weeks.  </a:t>
           </a:r>
         </a:p>
       </dsp:txBody>
@@ -3015,8 +3015,8 @@
             <a:buNone/>
           </a:pPr>
           <a:r>
-            <a:rPr lang="en-US" sz="1200" kern="1200"/>
-            <a:t>Create a function to iterate through the different pages and recollect all the data in two json files. One for selling apartments and another for renting apartments. I've got around 18000 rows and 58 columns of selling apartments and 2300 rows and 8 columns of renting apartments.</a:t>
+            <a:rPr lang="en-US" sz="1200" kern="1200" dirty="0"/>
+            <a:t>Create a function to iterate through the different pages and recollect all the data in two json files. One for selling apartments and another for renting apartments. I've got around 18000 rows and 58 columns of selling apartments and 2300 rows and 58 columns of renting apartments.</a:t>
           </a:r>
         </a:p>
       </dsp:txBody>
@@ -9493,7 +9493,7 @@
           <a:p>
             <a:r>
               <a:rPr lang="en-US" dirty="0"/>
-              <a:t>Normalizing json file</a:t>
+              <a:t>Normalizing json files</a:t>
             </a:r>
           </a:p>
           <a:p>
@@ -12652,7 +12652,7 @@
             </a:r>
             <a:r>
               <a:rPr lang="en-US" sz="1900" b="1" dirty="0"/>
-              <a:t> flats of the real state current Market. According to the analysis. A location between the three districts will be suitable.</a:t>
+              <a:t> flats of the real estate current Market. According to the analysis. A location between the three districts will be suitable.</a:t>
             </a:r>
           </a:p>
           <a:p>
@@ -13976,7 +13976,7 @@
               <a:buNone/>
             </a:pPr>
             <a:r>
-              <a:rPr lang="en-US" sz="2200">
+              <a:rPr lang="en-US" sz="2200" dirty="0">
                 <a:solidFill>
                   <a:schemeClr val="bg1"/>
                 </a:solidFill>
@@ -13985,7 +13985,31 @@
                 <a:ea typeface="Calibri" panose="020F0502020204030204" pitchFamily="34" charset="0"/>
                 <a:cs typeface="Arial" panose="020B0604020202020204" pitchFamily="34" charset="0"/>
               </a:rPr>
-              <a:t>A furniture Retailer wants to be closer the customers in the big city centers. They have decided to be open a bunch of PopupStores as a leap of faith to validate the assumption that the people will buy their furniture’s in the city centers.</a:t>
+              <a:t>A furniture Retailer wants to be closer the customers in the big city centers. They have decided to be open a bunch of </a:t>
+            </a:r>
+            <a:r>
+              <a:rPr lang="en-US" sz="2200" dirty="0" err="1">
+                <a:solidFill>
+                  <a:schemeClr val="bg1"/>
+                </a:solidFill>
+                <a:effectLst/>
+                <a:latin typeface="Calibri" panose="020F0502020204030204" pitchFamily="34" charset="0"/>
+                <a:ea typeface="Calibri" panose="020F0502020204030204" pitchFamily="34" charset="0"/>
+                <a:cs typeface="Arial" panose="020B0604020202020204" pitchFamily="34" charset="0"/>
+              </a:rPr>
+              <a:t>PopupStores</a:t>
+            </a:r>
+            <a:r>
+              <a:rPr lang="en-US" sz="2200" dirty="0">
+                <a:solidFill>
+                  <a:schemeClr val="bg1"/>
+                </a:solidFill>
+                <a:effectLst/>
+                <a:latin typeface="Calibri" panose="020F0502020204030204" pitchFamily="34" charset="0"/>
+                <a:ea typeface="Calibri" panose="020F0502020204030204" pitchFamily="34" charset="0"/>
+                <a:cs typeface="Arial" panose="020B0604020202020204" pitchFamily="34" charset="0"/>
+              </a:rPr>
+              <a:t> as a leap of faith to validate the assumption that the people will buy their furniture’s in the city centers.</a:t>
             </a:r>
           </a:p>
           <a:p>
@@ -13996,7 +14020,7 @@
               <a:buNone/>
             </a:pPr>
             <a:r>
-              <a:rPr lang="en-US" sz="2200">
+              <a:rPr lang="en-US" sz="2200" dirty="0">
                 <a:solidFill>
                   <a:schemeClr val="bg1"/>
                 </a:solidFill>
@@ -14016,7 +14040,7 @@
               <a:buNone/>
             </a:pPr>
             <a:r>
-              <a:rPr lang="en-US" sz="2200">
+              <a:rPr lang="en-US" sz="2200" dirty="0">
                 <a:solidFill>
                   <a:schemeClr val="bg1"/>
                 </a:solidFill>
@@ -14025,14 +14049,14 @@
                 <a:ea typeface="Calibri" panose="020F0502020204030204" pitchFamily="34" charset="0"/>
                 <a:cs typeface="Arial" panose="020B0604020202020204" pitchFamily="34" charset="0"/>
               </a:rPr>
-              <a:t>As a Data analyst I was asked to analyze the current real state market in Madrid to provide some insights about the location.</a:t>
+              <a:t>As a Data analyst I was asked to analyze the current real estate market in Madrid to provide some insights about the location.</a:t>
             </a:r>
           </a:p>
           <a:p>
             <a:pPr marL="0" indent="0">
               <a:buNone/>
             </a:pPr>
-            <a:endParaRPr lang="en-US" sz="2200">
+            <a:endParaRPr lang="en-US" sz="2200" dirty="0">
               <a:solidFill>
                 <a:schemeClr val="bg1"/>
               </a:solidFill>
@@ -14207,7 +14231,7 @@
             <p:ph idx="1"/>
             <p:extLst>
               <p:ext uri="{D42A27DB-BD31-4B8C-83A1-F6EECF244321}">
-                <p14:modId xmlns:p14="http://schemas.microsoft.com/office/powerpoint/2010/main" val="2623139442"/>
+                <p14:modId xmlns:p14="http://schemas.microsoft.com/office/powerpoint/2010/main" val="2044341479"/>
               </p:ext>
             </p:extLst>
           </p:nvPr>
@@ -14654,7 +14678,7 @@
                   <a:schemeClr val="bg1"/>
                 </a:solidFill>
               </a:rPr>
-              <a:t>Select one of the top real state web sites in Madrid: URL: </a:t>
+              <a:t>Select one of the top real estate web sites in Madrid: URL: </a:t>
             </a:r>
             <a:r>
               <a:rPr lang="en-US" sz="2200" dirty="0">
@@ -15836,7 +15860,7 @@
             <p:ph idx="1"/>
             <p:extLst>
               <p:ext uri="{D42A27DB-BD31-4B8C-83A1-F6EECF244321}">
-                <p14:modId xmlns:p14="http://schemas.microsoft.com/office/powerpoint/2010/main" val="1994274859"/>
+                <p14:modId xmlns:p14="http://schemas.microsoft.com/office/powerpoint/2010/main" val="932795783"/>
               </p:ext>
             </p:extLst>
           </p:nvPr>

</xml_diff>